<commit_message>
updated cell data sheet files and Presentation/ECE6710_06_PRESENTATION.pptx
</commit_message>
<xml_diff>
--- a/Documents/Presentation/ECE6710_06_PRESENTATION.pptx
+++ b/Documents/Presentation/ECE6710_06_PRESENTATION.pptx
@@ -514,44 +514,6 @@
           <a:bodyPr/>
           <a:lstStyle/>
           <a:p>
-            <a:r>
-              <a:rPr lang="en-US" dirty="0" smtClean="0"/>
-              <a:t>General purpose</a:t>
-            </a:r>
-          </a:p>
-          <a:p>
-            <a:r>
-              <a:rPr lang="en-US" dirty="0" smtClean="0"/>
-              <a:t>	-Not</a:t>
-            </a:r>
-            <a:r>
-              <a:rPr lang="en-US" baseline="0" dirty="0" smtClean="0"/>
-              <a:t> application specific.</a:t>
-            </a:r>
-          </a:p>
-          <a:p>
-            <a:r>
-              <a:rPr lang="en-US" baseline="0" dirty="0" smtClean="0"/>
-              <a:t>12.5 MHz clock speed</a:t>
-            </a:r>
-          </a:p>
-          <a:p>
-            <a:r>
-              <a:rPr lang="en-US" baseline="0" dirty="0" smtClean="0"/>
-              <a:t>	-ensures we can read and write to memory in one clock period</a:t>
-            </a:r>
-          </a:p>
-          <a:p>
-            <a:r>
-              <a:rPr lang="en-US" baseline="0" dirty="0" smtClean="0"/>
-              <a:t>4 TCU’s in size</a:t>
-            </a:r>
-          </a:p>
-          <a:p>
-            <a:r>
-              <a:rPr lang="en-US" baseline="0" dirty="0" smtClean="0"/>
-              <a:t>	-reduces the probability of needing custom cells and allows place and route to do the work.</a:t>
-            </a:r>
             <a:endParaRPr lang="en-US" dirty="0"/>
           </a:p>
         </p:txBody>
@@ -573,7 +535,7 @@
           <a:p>
             <a:fld id="{4B644C2F-004E-4293-AAD8-A1333BA60648}" type="slidenum">
               <a:rPr lang="en-US" smtClean="0"/>
-              <a:t>2</a:t>
+              <a:t>1</a:t>
             </a:fld>
             <a:endParaRPr lang="en-US"/>
           </a:p>
@@ -582,7 +544,7 @@
     </p:spTree>
     <p:extLst>
       <p:ext uri="{BB962C8B-B14F-4D97-AF65-F5344CB8AC3E}">
-        <p14:creationId xmlns:p14="http://schemas.microsoft.com/office/powerpoint/2010/main" val="4100363205"/>
+        <p14:creationId xmlns:p14="http://schemas.microsoft.com/office/powerpoint/2010/main" val="2921991114"/>
       </p:ext>
     </p:extLst>
   </p:cSld>
@@ -638,11 +600,41 @@
           <a:p>
             <a:r>
               <a:rPr lang="en-US" dirty="0" smtClean="0"/>
-              <a:t>This is how our chip look</a:t>
+              <a:t>General purpose</a:t>
+            </a:r>
+          </a:p>
+          <a:p>
+            <a:r>
+              <a:rPr lang="en-US" dirty="0" smtClean="0"/>
+              <a:t>	-Not</a:t>
             </a:r>
             <a:r>
               <a:rPr lang="en-US" baseline="0" dirty="0" smtClean="0"/>
-              <a:t> deployed in a system.</a:t>
+              <a:t> application specific.</a:t>
+            </a:r>
+          </a:p>
+          <a:p>
+            <a:r>
+              <a:rPr lang="en-US" baseline="0" dirty="0" smtClean="0"/>
+              <a:t>12.5 MHz clock speed</a:t>
+            </a:r>
+          </a:p>
+          <a:p>
+            <a:r>
+              <a:rPr lang="en-US" baseline="0" dirty="0" smtClean="0"/>
+              <a:t>	-ensures we can read and write to memory in one clock period</a:t>
+            </a:r>
+          </a:p>
+          <a:p>
+            <a:r>
+              <a:rPr lang="en-US" baseline="0" dirty="0" smtClean="0"/>
+              <a:t>4 TCU’s in size</a:t>
+            </a:r>
+          </a:p>
+          <a:p>
+            <a:r>
+              <a:rPr lang="en-US" baseline="0" dirty="0" smtClean="0"/>
+              <a:t>	-reduces the probability of needing custom cells and allows place and route to do the work.</a:t>
             </a:r>
             <a:endParaRPr lang="en-US" dirty="0"/>
           </a:p>
@@ -665,7 +657,7 @@
           <a:p>
             <a:fld id="{4B644C2F-004E-4293-AAD8-A1333BA60648}" type="slidenum">
               <a:rPr lang="en-US" smtClean="0"/>
-              <a:t>3</a:t>
+              <a:t>2</a:t>
             </a:fld>
             <a:endParaRPr lang="en-US"/>
           </a:p>
@@ -674,7 +666,7 @@
     </p:spTree>
     <p:extLst>
       <p:ext uri="{BB962C8B-B14F-4D97-AF65-F5344CB8AC3E}">
-        <p14:creationId xmlns:p14="http://schemas.microsoft.com/office/powerpoint/2010/main" val="3807032323"/>
+        <p14:creationId xmlns:p14="http://schemas.microsoft.com/office/powerpoint/2010/main" val="4100363205"/>
       </p:ext>
     </p:extLst>
   </p:cSld>
@@ -730,6 +722,98 @@
           <a:p>
             <a:r>
               <a:rPr lang="en-US" dirty="0" smtClean="0"/>
+              <a:t>This is how our chip look</a:t>
+            </a:r>
+            <a:r>
+              <a:rPr lang="en-US" baseline="0" dirty="0" smtClean="0"/>
+              <a:t> deployed in a system.</a:t>
+            </a:r>
+            <a:endParaRPr lang="en-US" dirty="0"/>
+          </a:p>
+        </p:txBody>
+      </p:sp>
+      <p:sp>
+        <p:nvSpPr>
+          <p:cNvPr id="4" name="Slide Number Placeholder 3"/>
+          <p:cNvSpPr>
+            <a:spLocks noGrp="1"/>
+          </p:cNvSpPr>
+          <p:nvPr>
+            <p:ph type="sldNum" sz="quarter" idx="10"/>
+          </p:nvPr>
+        </p:nvSpPr>
+        <p:spPr/>
+        <p:txBody>
+          <a:bodyPr/>
+          <a:lstStyle/>
+          <a:p>
+            <a:fld id="{4B644C2F-004E-4293-AAD8-A1333BA60648}" type="slidenum">
+              <a:rPr lang="en-US" smtClean="0"/>
+              <a:t>3</a:t>
+            </a:fld>
+            <a:endParaRPr lang="en-US"/>
+          </a:p>
+        </p:txBody>
+      </p:sp>
+    </p:spTree>
+    <p:extLst>
+      <p:ext uri="{BB962C8B-B14F-4D97-AF65-F5344CB8AC3E}">
+        <p14:creationId xmlns:p14="http://schemas.microsoft.com/office/powerpoint/2010/main" val="3807032323"/>
+      </p:ext>
+    </p:extLst>
+  </p:cSld>
+  <p:clrMapOvr>
+    <a:masterClrMapping/>
+  </p:clrMapOvr>
+</p:notes>
+</file>
+
+<file path=ppt/notesSlides/notesSlide4.xml><?xml version="1.0" encoding="utf-8"?>
+<p:notes xmlns:a="http://schemas.openxmlformats.org/drawingml/2006/main" xmlns:r="http://schemas.openxmlformats.org/officeDocument/2006/relationships" xmlns:p="http://schemas.openxmlformats.org/presentationml/2006/main">
+  <p:cSld>
+    <p:spTree>
+      <p:nvGrpSpPr>
+        <p:cNvPr id="1" name=""/>
+        <p:cNvGrpSpPr/>
+        <p:nvPr/>
+      </p:nvGrpSpPr>
+      <p:grpSpPr>
+        <a:xfrm>
+          <a:off x="0" y="0"/>
+          <a:ext cx="0" cy="0"/>
+          <a:chOff x="0" y="0"/>
+          <a:chExt cx="0" cy="0"/>
+        </a:xfrm>
+      </p:grpSpPr>
+      <p:sp>
+        <p:nvSpPr>
+          <p:cNvPr id="2" name="Slide Image Placeholder 1"/>
+          <p:cNvSpPr>
+            <a:spLocks noGrp="1" noRot="1" noChangeAspect="1"/>
+          </p:cNvSpPr>
+          <p:nvPr>
+            <p:ph type="sldImg"/>
+          </p:nvPr>
+        </p:nvSpPr>
+        <p:spPr/>
+      </p:sp>
+      <p:sp>
+        <p:nvSpPr>
+          <p:cNvPr id="3" name="Notes Placeholder 2"/>
+          <p:cNvSpPr>
+            <a:spLocks noGrp="1"/>
+          </p:cNvSpPr>
+          <p:nvPr>
+            <p:ph type="body" idx="1"/>
+          </p:nvPr>
+        </p:nvSpPr>
+        <p:spPr/>
+        <p:txBody>
+          <a:bodyPr/>
+          <a:lstStyle/>
+          <a:p>
+            <a:r>
+              <a:rPr lang="en-US" dirty="0" smtClean="0"/>
               <a:t>2 bit color VGA </a:t>
             </a:r>
           </a:p>
@@ -750,7 +834,6 @@
               <a:rPr lang="en-US" dirty="0" smtClean="0"/>
               <a:t>External access to ALU flag and FSM state bits for testing</a:t>
             </a:r>
-            <a:endParaRPr lang="en-US" dirty="0" smtClean="0"/>
           </a:p>
         </p:txBody>
       </p:sp>
@@ -790,7 +873,7 @@
 </p:notes>
 </file>
 
-<file path=ppt/notesSlides/notesSlide4.xml><?xml version="1.0" encoding="utf-8"?>
+<file path=ppt/notesSlides/notesSlide5.xml><?xml version="1.0" encoding="utf-8"?>
 <p:notes xmlns:a="http://schemas.openxmlformats.org/drawingml/2006/main" xmlns:r="http://schemas.openxmlformats.org/officeDocument/2006/relationships" xmlns:p="http://schemas.openxmlformats.org/presentationml/2006/main">
   <p:cSld>
     <p:spTree>

</xml_diff>

<commit_message>
Updated presentation slides. Added more video game pics to the intro. Also added the updated asic block diagram. Just need the Layout.
</commit_message>
<xml_diff>
--- a/Documents/Presentation/ECE6710_06_PRESENTATION.pptx
+++ b/Documents/Presentation/ECE6710_06_PRESENTATION.pptx
@@ -4803,6 +4803,45 @@
           <a:chExt cx="0" cy="0"/>
         </a:xfrm>
       </p:grpSpPr>
+      <p:pic>
+        <p:nvPicPr>
+          <p:cNvPr id="1030" name="Picture 6" descr="http://wiimedia.ign.com/wii/image/article/843/843696/startropics-review-20080104084134717.jpg"/>
+          <p:cNvPicPr>
+            <a:picLocks noChangeAspect="1" noChangeArrowheads="1"/>
+          </p:cNvPicPr>
+          <p:nvPr/>
+        </p:nvPicPr>
+        <p:blipFill rotWithShape="1">
+          <a:blip r:embed="rId3">
+            <a:extLst>
+              <a:ext uri="{28A0092B-C50C-407E-A947-70E740481C1C}">
+                <a14:useLocalDpi xmlns:a14="http://schemas.microsoft.com/office/drawing/2010/main" val="0"/>
+              </a:ext>
+            </a:extLst>
+          </a:blip>
+          <a:srcRect b="4099"/>
+          <a:stretch/>
+        </p:blipFill>
+        <p:spPr bwMode="auto">
+          <a:xfrm>
+            <a:off x="3103595" y="4205332"/>
+            <a:ext cx="4142430" cy="2118748"/>
+          </a:xfrm>
+          <a:prstGeom prst="rect">
+            <a:avLst/>
+          </a:prstGeom>
+          <a:noFill/>
+          <a:extLst>
+            <a:ext uri="{909E8E84-426E-40DD-AFC4-6F175D3DCCD1}">
+              <a14:hiddenFill xmlns:a14="http://schemas.microsoft.com/office/drawing/2010/main">
+                <a:solidFill>
+                  <a:srgbClr val="FFFFFF"/>
+                </a:solidFill>
+              </a14:hiddenFill>
+            </a:ext>
+          </a:extLst>
+        </p:spPr>
+      </p:pic>
       <p:sp>
         <p:nvSpPr>
           <p:cNvPr id="2" name="Title 1"/>
@@ -4835,7 +4874,7 @@
           <p:nvPr/>
         </p:nvPicPr>
         <p:blipFill>
-          <a:blip r:embed="rId3">
+          <a:blip r:embed="rId4">
             <a:extLst>
               <a:ext uri="{28A0092B-C50C-407E-A947-70E740481C1C}">
                 <a14:useLocalDpi xmlns:a14="http://schemas.microsoft.com/office/drawing/2010/main" val="0"/>
@@ -4876,7 +4915,7 @@
           <p:nvPr/>
         </p:nvPicPr>
         <p:blipFill>
-          <a:blip r:embed="rId4">
+          <a:blip r:embed="rId5">
             <a:extLst>
               <a:ext uri="{28A0092B-C50C-407E-A947-70E740481C1C}">
                 <a14:useLocalDpi xmlns:a14="http://schemas.microsoft.com/office/drawing/2010/main" val="0"/>
@@ -4917,7 +4956,7 @@
           <p:nvPr/>
         </p:nvPicPr>
         <p:blipFill>
-          <a:blip r:embed="rId5">
+          <a:blip r:embed="rId6">
             <a:extLst>
               <a:ext uri="{28A0092B-C50C-407E-A947-70E740481C1C}">
                 <a14:useLocalDpi xmlns:a14="http://schemas.microsoft.com/office/drawing/2010/main" val="0"/>
@@ -4931,8 +4970,8 @@
         </p:blipFill>
         <p:spPr bwMode="auto">
           <a:xfrm>
-            <a:off x="6078298" y="4304779"/>
-            <a:ext cx="2862072" cy="2020824"/>
+            <a:off x="6087444" y="4293219"/>
+            <a:ext cx="2843780" cy="2043944"/>
           </a:xfrm>
           <a:prstGeom prst="rect">
             <a:avLst/>
@@ -4958,7 +4997,7 @@
           <p:nvPr/>
         </p:nvPicPr>
         <p:blipFill>
-          <a:blip r:embed="rId6">
+          <a:blip r:embed="rId7">
             <a:extLst>
               <a:ext uri="{28A0092B-C50C-407E-A947-70E740481C1C}">
                 <a14:useLocalDpi xmlns:a14="http://schemas.microsoft.com/office/drawing/2010/main" val="0"/>
@@ -4972,8 +5011,129 @@
         </p:blipFill>
         <p:spPr bwMode="auto">
           <a:xfrm>
-            <a:off x="8935797" y="2283955"/>
+            <a:off x="8931224" y="2272395"/>
             <a:ext cx="2862072" cy="2020824"/>
+          </a:xfrm>
+          <a:prstGeom prst="rect">
+            <a:avLst/>
+          </a:prstGeom>
+          <a:noFill/>
+          <a:extLst>
+            <a:ext uri="{909E8E84-426E-40DD-AFC4-6F175D3DCCD1}">
+              <a14:hiddenFill xmlns:a14="http://schemas.microsoft.com/office/drawing/2010/main">
+                <a:solidFill>
+                  <a:srgbClr val="FFFFFF"/>
+                </a:solidFill>
+              </a14:hiddenFill>
+            </a:ext>
+          </a:extLst>
+        </p:spPr>
+      </p:pic>
+      <p:pic>
+        <p:nvPicPr>
+          <p:cNvPr id="1026" name="Picture 2" descr="http://cdn3.dualshockers.com/wp-content/uploads/2011/05/chipschallenge-ds1-670x469-constrain.jpg"/>
+          <p:cNvPicPr>
+            <a:picLocks noChangeAspect="1" noChangeArrowheads="1"/>
+          </p:cNvPicPr>
+          <p:nvPr/>
+        </p:nvPicPr>
+        <p:blipFill>
+          <a:blip r:embed="rId8">
+            <a:extLst>
+              <a:ext uri="{28A0092B-C50C-407E-A947-70E740481C1C}">
+                <a14:useLocalDpi xmlns:a14="http://schemas.microsoft.com/office/drawing/2010/main" val="0"/>
+              </a:ext>
+            </a:extLst>
+          </a:blip>
+          <a:srcRect/>
+          <a:stretch>
+            <a:fillRect/>
+          </a:stretch>
+        </p:blipFill>
+        <p:spPr bwMode="auto">
+          <a:xfrm>
+            <a:off x="329334" y="2283955"/>
+            <a:ext cx="2886892" cy="2020824"/>
+          </a:xfrm>
+          <a:prstGeom prst="rect">
+            <a:avLst/>
+          </a:prstGeom>
+          <a:noFill/>
+          <a:extLst>
+            <a:ext uri="{909E8E84-426E-40DD-AFC4-6F175D3DCCD1}">
+              <a14:hiddenFill xmlns:a14="http://schemas.microsoft.com/office/drawing/2010/main">
+                <a:solidFill>
+                  <a:srgbClr val="FFFFFF"/>
+                </a:solidFill>
+              </a14:hiddenFill>
+            </a:ext>
+          </a:extLst>
+        </p:spPr>
+      </p:pic>
+      <p:pic>
+        <p:nvPicPr>
+          <p:cNvPr id="1028" name="Picture 4" descr="http://wiimedia.ign.com/wii/image/article/849/849905/adventures-of-lolo-2-virtual-console-20080205063151188.jpg"/>
+          <p:cNvPicPr>
+            <a:picLocks noChangeAspect="1" noChangeArrowheads="1"/>
+          </p:cNvPicPr>
+          <p:nvPr/>
+        </p:nvPicPr>
+        <p:blipFill rotWithShape="1">
+          <a:blip r:embed="rId9">
+            <a:extLst>
+              <a:ext uri="{28A0092B-C50C-407E-A947-70E740481C1C}">
+                <a14:useLocalDpi xmlns:a14="http://schemas.microsoft.com/office/drawing/2010/main" val="0"/>
+              </a:ext>
+            </a:extLst>
+          </a:blip>
+          <a:srcRect l="390" t="-18701" r="-390" b="19482"/>
+          <a:stretch/>
+        </p:blipFill>
+        <p:spPr bwMode="auto">
+          <a:xfrm>
+            <a:off x="6044332" y="1808470"/>
+            <a:ext cx="2920858" cy="2484749"/>
+          </a:xfrm>
+          <a:prstGeom prst="rect">
+            <a:avLst/>
+          </a:prstGeom>
+          <a:noFill/>
+          <a:extLst>
+            <a:ext uri="{909E8E84-426E-40DD-AFC4-6F175D3DCCD1}">
+              <a14:hiddenFill xmlns:a14="http://schemas.microsoft.com/office/drawing/2010/main">
+                <a:solidFill>
+                  <a:srgbClr val="FFFFFF"/>
+                </a:solidFill>
+              </a14:hiddenFill>
+            </a:ext>
+          </a:extLst>
+        </p:spPr>
+      </p:pic>
+      <p:pic>
+        <p:nvPicPr>
+          <p:cNvPr id="1032" name="Picture 8" descr="https://encrypted-tbn3.gstatic.com/images?q=tbn:ANd9GcTpTJ9PgZl0jXSLe6NnezPVRbrgH_hVv0o5K0IvG9XPEuI9zRo7"/>
+          <p:cNvPicPr>
+            <a:picLocks noChangeAspect="1" noChangeArrowheads="1"/>
+          </p:cNvPicPr>
+          <p:nvPr/>
+        </p:nvPicPr>
+        <p:blipFill>
+          <a:blip r:embed="rId10">
+            <a:extLst>
+              <a:ext uri="{28A0092B-C50C-407E-A947-70E740481C1C}">
+                <a14:useLocalDpi xmlns:a14="http://schemas.microsoft.com/office/drawing/2010/main" val="0"/>
+              </a:ext>
+            </a:extLst>
+          </a:blip>
+          <a:srcRect/>
+          <a:stretch>
+            <a:fillRect/>
+          </a:stretch>
+        </p:blipFill>
+        <p:spPr bwMode="auto">
+          <a:xfrm>
+            <a:off x="8931224" y="4260006"/>
+            <a:ext cx="2862072" cy="2064074"/>
           </a:xfrm>
           <a:prstGeom prst="rect">
             <a:avLst/>
@@ -5405,7 +5565,7 @@
       </p:grpSpPr>
       <p:pic>
         <p:nvPicPr>
-          <p:cNvPr id="2" name="Picture 2" descr="https://documents.lucidchart.com/documents/117d4369-5faf-4dee-8078-490c3d7673d6/pages/k6OtxLzFPb4r?a=16392&amp;x=317&amp;y=-57&amp;w=2995&amp;h=2230&amp;store=1&amp;accept=image%2F*&amp;auth=LCA%203bde938bef7dbef168d5149223d8bbf5d443547c-ts%3D1449511629"/>
+          <p:cNvPr id="2052" name="Picture 4" descr="https://documents.lucidchart.com/documents/117d4369-5faf-4dee-8078-490c3d7673d6/pages/Y-8z01yzstyj?a=18476&amp;x=63&amp;y=-55&amp;w=3299&amp;h=2389&amp;store=1&amp;accept=image%2F*&amp;auth=LCA%209d5420371db9dd9bf0b00c571ab7d6c8f6ccbb12-ts%3D1449541173"/>
           <p:cNvPicPr>
             <a:picLocks noChangeAspect="1" noChangeArrowheads="1"/>
           </p:cNvPicPr>
@@ -5426,8 +5586,8 @@
         </p:blipFill>
         <p:spPr bwMode="auto">
           <a:xfrm>
-            <a:off x="1" y="1"/>
-            <a:ext cx="12192000" cy="6431280"/>
+            <a:off x="1785434" y="-99937"/>
+            <a:ext cx="8819376" cy="6388164"/>
           </a:xfrm>
           <a:prstGeom prst="rect">
             <a:avLst/>
@@ -5565,12 +5725,13 @@
             <a:pPr algn="ctr"/>
             <a:r>
               <a:rPr lang="en-US" dirty="0"/>
-              <a:t>Andrew Bradbury</a:t>
+              <a:t>Andrew </a:t>
             </a:r>
             <a:r>
               <a:rPr lang="en-US" dirty="0" smtClean="0"/>
-              <a:t>: a.bradbury8@gmail.com</a:t>
-            </a:r>
+              <a:t>Bradbury: a.bradbury@utah.edu</a:t>
+            </a:r>
+            <a:endParaRPr lang="en-US" dirty="0" smtClean="0"/>
           </a:p>
           <a:p>
             <a:pPr algn="ctr"/>

</xml_diff>